<commit_message>
envio do 4 video
cadastro de empresas
</commit_message>
<xml_diff>
--- a/DIVERSOS ARQUIVOS DO PROJETO/logo Cosmos e Contabilimax/logo_CONTABILIMAX .pptx
+++ b/DIVERSOS ARQUIVOS DO PROJETO/logo Cosmos e Contabilimax/logo_CONTABILIMAX .pptx
@@ -261,7 +261,7 @@
           <a:p>
             <a:fld id="{8A088855-E0D2-4F6E-B4C0-4EADC6426C1C}" type="datetimeFigureOut">
               <a:rPr lang="pt-BR" smtClean="0"/>
-              <a:t>09/02/2022</a:t>
+              <a:t>15/02/2022</a:t>
             </a:fld>
             <a:endParaRPr lang="pt-BR"/>
           </a:p>
@@ -459,7 +459,7 @@
           <a:p>
             <a:fld id="{8A088855-E0D2-4F6E-B4C0-4EADC6426C1C}" type="datetimeFigureOut">
               <a:rPr lang="pt-BR" smtClean="0"/>
-              <a:t>09/02/2022</a:t>
+              <a:t>15/02/2022</a:t>
             </a:fld>
             <a:endParaRPr lang="pt-BR"/>
           </a:p>
@@ -667,7 +667,7 @@
           <a:p>
             <a:fld id="{8A088855-E0D2-4F6E-B4C0-4EADC6426C1C}" type="datetimeFigureOut">
               <a:rPr lang="pt-BR" smtClean="0"/>
-              <a:t>09/02/2022</a:t>
+              <a:t>15/02/2022</a:t>
             </a:fld>
             <a:endParaRPr lang="pt-BR"/>
           </a:p>
@@ -865,7 +865,7 @@
           <a:p>
             <a:fld id="{8A088855-E0D2-4F6E-B4C0-4EADC6426C1C}" type="datetimeFigureOut">
               <a:rPr lang="pt-BR" smtClean="0"/>
-              <a:t>09/02/2022</a:t>
+              <a:t>15/02/2022</a:t>
             </a:fld>
             <a:endParaRPr lang="pt-BR"/>
           </a:p>
@@ -1140,7 +1140,7 @@
           <a:p>
             <a:fld id="{8A088855-E0D2-4F6E-B4C0-4EADC6426C1C}" type="datetimeFigureOut">
               <a:rPr lang="pt-BR" smtClean="0"/>
-              <a:t>09/02/2022</a:t>
+              <a:t>15/02/2022</a:t>
             </a:fld>
             <a:endParaRPr lang="pt-BR"/>
           </a:p>
@@ -1405,7 +1405,7 @@
           <a:p>
             <a:fld id="{8A088855-E0D2-4F6E-B4C0-4EADC6426C1C}" type="datetimeFigureOut">
               <a:rPr lang="pt-BR" smtClean="0"/>
-              <a:t>09/02/2022</a:t>
+              <a:t>15/02/2022</a:t>
             </a:fld>
             <a:endParaRPr lang="pt-BR"/>
           </a:p>
@@ -1817,7 +1817,7 @@
           <a:p>
             <a:fld id="{8A088855-E0D2-4F6E-B4C0-4EADC6426C1C}" type="datetimeFigureOut">
               <a:rPr lang="pt-BR" smtClean="0"/>
-              <a:t>09/02/2022</a:t>
+              <a:t>15/02/2022</a:t>
             </a:fld>
             <a:endParaRPr lang="pt-BR"/>
           </a:p>
@@ -1958,7 +1958,7 @@
           <a:p>
             <a:fld id="{8A088855-E0D2-4F6E-B4C0-4EADC6426C1C}" type="datetimeFigureOut">
               <a:rPr lang="pt-BR" smtClean="0"/>
-              <a:t>09/02/2022</a:t>
+              <a:t>15/02/2022</a:t>
             </a:fld>
             <a:endParaRPr lang="pt-BR"/>
           </a:p>
@@ -2071,7 +2071,7 @@
           <a:p>
             <a:fld id="{8A088855-E0D2-4F6E-B4C0-4EADC6426C1C}" type="datetimeFigureOut">
               <a:rPr lang="pt-BR" smtClean="0"/>
-              <a:t>09/02/2022</a:t>
+              <a:t>15/02/2022</a:t>
             </a:fld>
             <a:endParaRPr lang="pt-BR"/>
           </a:p>
@@ -2382,7 +2382,7 @@
           <a:p>
             <a:fld id="{8A088855-E0D2-4F6E-B4C0-4EADC6426C1C}" type="datetimeFigureOut">
               <a:rPr lang="pt-BR" smtClean="0"/>
-              <a:t>09/02/2022</a:t>
+              <a:t>15/02/2022</a:t>
             </a:fld>
             <a:endParaRPr lang="pt-BR"/>
           </a:p>
@@ -2670,7 +2670,7 @@
           <a:p>
             <a:fld id="{8A088855-E0D2-4F6E-B4C0-4EADC6426C1C}" type="datetimeFigureOut">
               <a:rPr lang="pt-BR" smtClean="0"/>
-              <a:t>09/02/2022</a:t>
+              <a:t>15/02/2022</a:t>
             </a:fld>
             <a:endParaRPr lang="pt-BR"/>
           </a:p>
@@ -2911,7 +2911,7 @@
           <a:p>
             <a:fld id="{8A088855-E0D2-4F6E-B4C0-4EADC6426C1C}" type="datetimeFigureOut">
               <a:rPr lang="pt-BR" smtClean="0"/>
-              <a:t>09/02/2022</a:t>
+              <a:t>15/02/2022</a:t>
             </a:fld>
             <a:endParaRPr lang="pt-BR"/>
           </a:p>
@@ -4911,106 +4911,28 @@
                             </p:stCondLst>
                             <p:childTnLst>
                               <p:par>
-                                <p:cTn id="5" presetID="31" presetClass="entr" presetSubtype="0" fill="hold" nodeType="clickEffect">
+                                <p:cTn id="5" presetID="26" presetClass="emph" presetSubtype="0" fill="hold" nodeType="clickEffect">
                                   <p:stCondLst>
                                     <p:cond delay="0"/>
                                   </p:stCondLst>
                                   <p:childTnLst>
-                                    <p:set>
+                                    <p:animEffect transition="out" filter="fade">
                                       <p:cBhvr>
-                                        <p:cTn id="6" dur="1" fill="hold">
-                                          <p:stCondLst>
-                                            <p:cond delay="0"/>
-                                          </p:stCondLst>
-                                        </p:cTn>
-                                        <p:tgtEl>
-                                          <p:spTgt spid="15"/>
-                                        </p:tgtEl>
-                                        <p:attrNameLst>
-                                          <p:attrName>style.visibility</p:attrName>
-                                        </p:attrNameLst>
-                                      </p:cBhvr>
-                                      <p:to>
-                                        <p:strVal val="visible"/>
-                                      </p:to>
-                                    </p:set>
-                                    <p:anim calcmode="lin" valueType="num">
-                                      <p:cBhvr>
-                                        <p:cTn id="7" dur="1500" fill="hold"/>
-                                        <p:tgtEl>
-                                          <p:spTgt spid="15"/>
-                                        </p:tgtEl>
-                                        <p:attrNameLst>
-                                          <p:attrName>ppt_w</p:attrName>
-                                        </p:attrNameLst>
-                                      </p:cBhvr>
-                                      <p:tavLst>
-                                        <p:tav tm="0">
-                                          <p:val>
-                                            <p:fltVal val="0"/>
-                                          </p:val>
-                                        </p:tav>
-                                        <p:tav tm="100000">
-                                          <p:val>
-                                            <p:strVal val="#ppt_w"/>
-                                          </p:val>
-                                        </p:tav>
-                                      </p:tavLst>
-                                    </p:anim>
-                                    <p:anim calcmode="lin" valueType="num">
-                                      <p:cBhvr>
-                                        <p:cTn id="8" dur="1500" fill="hold"/>
-                                        <p:tgtEl>
-                                          <p:spTgt spid="15"/>
-                                        </p:tgtEl>
-                                        <p:attrNameLst>
-                                          <p:attrName>ppt_h</p:attrName>
-                                        </p:attrNameLst>
-                                      </p:cBhvr>
-                                      <p:tavLst>
-                                        <p:tav tm="0">
-                                          <p:val>
-                                            <p:fltVal val="0"/>
-                                          </p:val>
-                                        </p:tav>
-                                        <p:tav tm="100000">
-                                          <p:val>
-                                            <p:strVal val="#ppt_h"/>
-                                          </p:val>
-                                        </p:tav>
-                                      </p:tavLst>
-                                    </p:anim>
-                                    <p:anim calcmode="lin" valueType="num">
-                                      <p:cBhvr>
-                                        <p:cTn id="9" dur="1500" fill="hold"/>
-                                        <p:tgtEl>
-                                          <p:spTgt spid="15"/>
-                                        </p:tgtEl>
-                                        <p:attrNameLst>
-                                          <p:attrName>style.rotation</p:attrName>
-                                        </p:attrNameLst>
-                                      </p:cBhvr>
-                                      <p:tavLst>
-                                        <p:tav tm="0">
-                                          <p:val>
-                                            <p:fltVal val="90"/>
-                                          </p:val>
-                                        </p:tav>
-                                        <p:tav tm="100000">
-                                          <p:val>
-                                            <p:fltVal val="0"/>
-                                          </p:val>
-                                        </p:tav>
-                                      </p:tavLst>
-                                    </p:anim>
-                                    <p:animEffect transition="in" filter="fade">
-                                      <p:cBhvr>
-                                        <p:cTn id="10" dur="1500"/>
+                                        <p:cTn id="6" dur="1000" tmFilter="0, 0; .2, .5; .8, .5; 1, 0"/>
                                         <p:tgtEl>
                                           <p:spTgt spid="15"/>
                                         </p:tgtEl>
                                       </p:cBhvr>
                                     </p:animEffect>
+                                    <p:animScale>
+                                      <p:cBhvr>
+                                        <p:cTn id="7" dur="500" autoRev="1" fill="hold"/>
+                                        <p:tgtEl>
+                                          <p:spTgt spid="15"/>
+                                        </p:tgtEl>
+                                      </p:cBhvr>
+                                      <p:by x="105000" y="105000"/>
+                                    </p:animScale>
                                   </p:childTnLst>
                                 </p:cTn>
                               </p:par>
@@ -6471,9 +6393,6 @@
                     <p:cTn id="3" fill="hold">
                       <p:stCondLst>
                         <p:cond delay="indefinite"/>
-                        <p:cond evt="onBegin" delay="0">
-                          <p:tn val="2"/>
-                        </p:cond>
                       </p:stCondLst>
                       <p:childTnLst>
                         <p:par>
@@ -6483,16 +6402,151 @@
                             </p:stCondLst>
                             <p:childTnLst>
                               <p:par>
-                                <p:cTn id="5" presetID="45" presetClass="entr" presetSubtype="0" fill="hold" grpId="0" nodeType="withEffect">
+                                <p:cTn id="5" presetID="42" presetClass="exit" presetSubtype="0" fill="hold" nodeType="clickEffect">
                                   <p:stCondLst>
                                     <p:cond delay="0"/>
                                   </p:stCondLst>
                                   <p:childTnLst>
+                                    <p:animEffect transition="out" filter="fade">
+                                      <p:cBhvr>
+                                        <p:cTn id="6" dur="1000"/>
+                                        <p:tgtEl>
+                                          <p:spTgt spid="4"/>
+                                        </p:tgtEl>
+                                      </p:cBhvr>
+                                    </p:animEffect>
+                                    <p:anim calcmode="lin" valueType="num">
+                                      <p:cBhvr>
+                                        <p:cTn id="7" dur="1000"/>
+                                        <p:tgtEl>
+                                          <p:spTgt spid="4"/>
+                                        </p:tgtEl>
+                                        <p:attrNameLst>
+                                          <p:attrName>ppt_x</p:attrName>
+                                        </p:attrNameLst>
+                                      </p:cBhvr>
+                                      <p:tavLst>
+                                        <p:tav tm="0">
+                                          <p:val>
+                                            <p:strVal val="ppt_x"/>
+                                          </p:val>
+                                        </p:tav>
+                                        <p:tav tm="100000">
+                                          <p:val>
+                                            <p:strVal val="ppt_x"/>
+                                          </p:val>
+                                        </p:tav>
+                                      </p:tavLst>
+                                    </p:anim>
+                                    <p:anim calcmode="lin" valueType="num">
+                                      <p:cBhvr>
+                                        <p:cTn id="8" dur="1000"/>
+                                        <p:tgtEl>
+                                          <p:spTgt spid="4"/>
+                                        </p:tgtEl>
+                                        <p:attrNameLst>
+                                          <p:attrName>ppt_y</p:attrName>
+                                        </p:attrNameLst>
+                                      </p:cBhvr>
+                                      <p:tavLst>
+                                        <p:tav tm="0">
+                                          <p:val>
+                                            <p:strVal val="ppt_y"/>
+                                          </p:val>
+                                        </p:tav>
+                                        <p:tav tm="100000">
+                                          <p:val>
+                                            <p:strVal val="ppt_y+.1"/>
+                                          </p:val>
+                                        </p:tav>
+                                      </p:tavLst>
+                                    </p:anim>
                                     <p:set>
                                       <p:cBhvr>
-                                        <p:cTn id="6" dur="1" fill="hold">
+                                        <p:cTn id="9" dur="1" fill="hold">
                                           <p:stCondLst>
-                                            <p:cond delay="0"/>
+                                            <p:cond delay="999"/>
+                                          </p:stCondLst>
+                                        </p:cTn>
+                                        <p:tgtEl>
+                                          <p:spTgt spid="4"/>
+                                        </p:tgtEl>
+                                        <p:attrNameLst>
+                                          <p:attrName>style.visibility</p:attrName>
+                                        </p:attrNameLst>
+                                      </p:cBhvr>
+                                      <p:to>
+                                        <p:strVal val="hidden"/>
+                                      </p:to>
+                                    </p:set>
+                                  </p:childTnLst>
+                                </p:cTn>
+                              </p:par>
+                              <p:par>
+                                <p:cTn id="10" presetID="42" presetClass="exit" presetSubtype="0" fill="hold" grpId="0" nodeType="withEffect">
+                                  <p:stCondLst>
+                                    <p:cond delay="0"/>
+                                  </p:stCondLst>
+                                  <p:childTnLst>
+                                    <p:animEffect transition="out" filter="fade">
+                                      <p:cBhvr>
+                                        <p:cTn id="11" dur="1000"/>
+                                        <p:tgtEl>
+                                          <p:spTgt spid="12"/>
+                                        </p:tgtEl>
+                                      </p:cBhvr>
+                                    </p:animEffect>
+                                    <p:anim calcmode="lin" valueType="num">
+                                      <p:cBhvr>
+                                        <p:cTn id="12" dur="1000"/>
+                                        <p:tgtEl>
+                                          <p:spTgt spid="12"/>
+                                        </p:tgtEl>
+                                        <p:attrNameLst>
+                                          <p:attrName>ppt_x</p:attrName>
+                                        </p:attrNameLst>
+                                      </p:cBhvr>
+                                      <p:tavLst>
+                                        <p:tav tm="0">
+                                          <p:val>
+                                            <p:strVal val="ppt_x"/>
+                                          </p:val>
+                                        </p:tav>
+                                        <p:tav tm="100000">
+                                          <p:val>
+                                            <p:strVal val="ppt_x"/>
+                                          </p:val>
+                                        </p:tav>
+                                      </p:tavLst>
+                                    </p:anim>
+                                    <p:anim calcmode="lin" valueType="num">
+                                      <p:cBhvr>
+                                        <p:cTn id="13" dur="1000"/>
+                                        <p:tgtEl>
+                                          <p:spTgt spid="12"/>
+                                        </p:tgtEl>
+                                        <p:attrNameLst>
+                                          <p:attrName>ppt_y</p:attrName>
+                                        </p:attrNameLst>
+                                      </p:cBhvr>
+                                      <p:tavLst>
+                                        <p:tav tm="0">
+                                          <p:val>
+                                            <p:strVal val="ppt_y"/>
+                                          </p:val>
+                                        </p:tav>
+                                        <p:tav tm="100000">
+                                          <p:val>
+                                            <p:strVal val="ppt_y+.1"/>
+                                          </p:val>
+                                        </p:tav>
+                                      </p:tavLst>
+                                    </p:anim>
+                                    <p:set>
+                                      <p:cBhvr>
+                                        <p:cTn id="14" dur="1" fill="hold">
+                                          <p:stCondLst>
+                                            <p:cond delay="999"/>
                                           </p:stCondLst>
                                         </p:cTn>
                                         <p:tgtEl>
@@ -6503,63 +6557,9 @@
                                         </p:attrNameLst>
                                       </p:cBhvr>
                                       <p:to>
-                                        <p:strVal val="visible"/>
+                                        <p:strVal val="hidden"/>
                                       </p:to>
                                     </p:set>
-                                    <p:animEffect transition="in" filter="fade">
-                                      <p:cBhvr>
-                                        <p:cTn id="7" dur="2500"/>
-                                        <p:tgtEl>
-                                          <p:spTgt spid="12"/>
-                                        </p:tgtEl>
-                                      </p:cBhvr>
-                                    </p:animEffect>
-                                    <p:anim calcmode="lin" valueType="num">
-                                      <p:cBhvr>
-                                        <p:cTn id="8" dur="2500" fill="hold"/>
-                                        <p:tgtEl>
-                                          <p:spTgt spid="12"/>
-                                        </p:tgtEl>
-                                        <p:attrNameLst>
-                                          <p:attrName>ppt_w</p:attrName>
-                                        </p:attrNameLst>
-                                      </p:cBhvr>
-                                      <p:tavLst>
-                                        <p:tav tm="0" fmla="#ppt_w*sin(2.5*pi*$)">
-                                          <p:val>
-                                            <p:fltVal val="0"/>
-                                          </p:val>
-                                        </p:tav>
-                                        <p:tav tm="100000">
-                                          <p:val>
-                                            <p:fltVal val="1"/>
-                                          </p:val>
-                                        </p:tav>
-                                      </p:tavLst>
-                                    </p:anim>
-                                    <p:anim calcmode="lin" valueType="num">
-                                      <p:cBhvr>
-                                        <p:cTn id="9" dur="2500" fill="hold"/>
-                                        <p:tgtEl>
-                                          <p:spTgt spid="12"/>
-                                        </p:tgtEl>
-                                        <p:attrNameLst>
-                                          <p:attrName>ppt_h</p:attrName>
-                                        </p:attrNameLst>
-                                      </p:cBhvr>
-                                      <p:tavLst>
-                                        <p:tav tm="0">
-                                          <p:val>
-                                            <p:strVal val="#ppt_h"/>
-                                          </p:val>
-                                        </p:tav>
-                                        <p:tav tm="100000">
-                                          <p:val>
-                                            <p:strVal val="#ppt_h"/>
-                                          </p:val>
-                                        </p:tav>
-                                      </p:tavLst>
-                                    </p:anim>
                                   </p:childTnLst>
                                 </p:cTn>
                               </p:par>

</xml_diff>